<commit_message>
Updates from review. Update schemas.
</commit_message>
<xml_diff>
--- a/TileFormats/VectorData/figures/figues.pptx
+++ b/TileFormats/VectorData/figures/figues.pptx
@@ -308,7 +308,7 @@
           <a:p>
             <a:fld id="{E44376AC-B3C2-8643-B9A3-A6905164CDF3}" type="datetimeFigureOut">
               <a:rPr lang="en-US" smtClean="0"/>
-              <a:t>12/11/2017</a:t>
+              <a:t>1/3/2018</a:t>
             </a:fld>
             <a:endParaRPr lang="en-US"/>
           </a:p>
@@ -478,7 +478,7 @@
           <a:p>
             <a:fld id="{E44376AC-B3C2-8643-B9A3-A6905164CDF3}" type="datetimeFigureOut">
               <a:rPr lang="en-US" smtClean="0"/>
-              <a:t>12/11/2017</a:t>
+              <a:t>1/3/2018</a:t>
             </a:fld>
             <a:endParaRPr lang="en-US"/>
           </a:p>
@@ -658,7 +658,7 @@
           <a:p>
             <a:fld id="{E44376AC-B3C2-8643-B9A3-A6905164CDF3}" type="datetimeFigureOut">
               <a:rPr lang="en-US" smtClean="0"/>
-              <a:t>12/11/2017</a:t>
+              <a:t>1/3/2018</a:t>
             </a:fld>
             <a:endParaRPr lang="en-US"/>
           </a:p>
@@ -828,7 +828,7 @@
           <a:p>
             <a:fld id="{E44376AC-B3C2-8643-B9A3-A6905164CDF3}" type="datetimeFigureOut">
               <a:rPr lang="en-US" smtClean="0"/>
-              <a:t>12/11/2017</a:t>
+              <a:t>1/3/2018</a:t>
             </a:fld>
             <a:endParaRPr lang="en-US"/>
           </a:p>
@@ -1074,7 +1074,7 @@
           <a:p>
             <a:fld id="{E44376AC-B3C2-8643-B9A3-A6905164CDF3}" type="datetimeFigureOut">
               <a:rPr lang="en-US" smtClean="0"/>
-              <a:t>12/11/2017</a:t>
+              <a:t>1/3/2018</a:t>
             </a:fld>
             <a:endParaRPr lang="en-US"/>
           </a:p>
@@ -1362,7 +1362,7 @@
           <a:p>
             <a:fld id="{E44376AC-B3C2-8643-B9A3-A6905164CDF3}" type="datetimeFigureOut">
               <a:rPr lang="en-US" smtClean="0"/>
-              <a:t>12/11/2017</a:t>
+              <a:t>1/3/2018</a:t>
             </a:fld>
             <a:endParaRPr lang="en-US"/>
           </a:p>
@@ -1784,7 +1784,7 @@
           <a:p>
             <a:fld id="{E44376AC-B3C2-8643-B9A3-A6905164CDF3}" type="datetimeFigureOut">
               <a:rPr lang="en-US" smtClean="0"/>
-              <a:t>12/11/2017</a:t>
+              <a:t>1/3/2018</a:t>
             </a:fld>
             <a:endParaRPr lang="en-US"/>
           </a:p>
@@ -1902,7 +1902,7 @@
           <a:p>
             <a:fld id="{E44376AC-B3C2-8643-B9A3-A6905164CDF3}" type="datetimeFigureOut">
               <a:rPr lang="en-US" smtClean="0"/>
-              <a:t>12/11/2017</a:t>
+              <a:t>1/3/2018</a:t>
             </a:fld>
             <a:endParaRPr lang="en-US"/>
           </a:p>
@@ -1997,7 +1997,7 @@
           <a:p>
             <a:fld id="{E44376AC-B3C2-8643-B9A3-A6905164CDF3}" type="datetimeFigureOut">
               <a:rPr lang="en-US" smtClean="0"/>
-              <a:t>12/11/2017</a:t>
+              <a:t>1/3/2018</a:t>
             </a:fld>
             <a:endParaRPr lang="en-US"/>
           </a:p>
@@ -2274,7 +2274,7 @@
           <a:p>
             <a:fld id="{E44376AC-B3C2-8643-B9A3-A6905164CDF3}" type="datetimeFigureOut">
               <a:rPr lang="en-US" smtClean="0"/>
-              <a:t>12/11/2017</a:t>
+              <a:t>1/3/2018</a:t>
             </a:fld>
             <a:endParaRPr lang="en-US"/>
           </a:p>
@@ -2527,7 +2527,7 @@
           <a:p>
             <a:fld id="{E44376AC-B3C2-8643-B9A3-A6905164CDF3}" type="datetimeFigureOut">
               <a:rPr lang="en-US" smtClean="0"/>
-              <a:t>12/11/2017</a:t>
+              <a:t>1/3/2018</a:t>
             </a:fld>
             <a:endParaRPr lang="en-US"/>
           </a:p>
@@ -2740,7 +2740,7 @@
           <a:p>
             <a:fld id="{E44376AC-B3C2-8643-B9A3-A6905164CDF3}" type="datetimeFigureOut">
               <a:rPr lang="en-US" smtClean="0"/>
-              <a:t>12/11/2017</a:t>
+              <a:t>1/3/2018</a:t>
             </a:fld>
             <a:endParaRPr lang="en-US"/>
           </a:p>
@@ -6558,8 +6558,19 @@
                 <a:latin typeface="Courier New"/>
                 <a:cs typeface="Courier New"/>
               </a:rPr>
-              <a:t> / 2</a:t>
-            </a:r>
+              <a:t> / </a:t>
+            </a:r>
+            <a:r>
+              <a:rPr lang="en-US" sz="1050" dirty="0" smtClean="0">
+                <a:latin typeface="Courier New"/>
+                <a:cs typeface="Courier New"/>
+              </a:rPr>
+              <a:t>3</a:t>
+            </a:r>
+            <a:endParaRPr lang="en-US" sz="1050" dirty="0" smtClean="0">
+              <a:latin typeface="Courier New"/>
+              <a:cs typeface="Courier New"/>
+            </a:endParaRPr>
           </a:p>
           <a:p>
             <a:pPr algn="ctr"/>
@@ -7790,8 +7801,19 @@
                 <a:latin typeface="Courier New"/>
                 <a:cs typeface="Courier New"/>
               </a:rPr>
-              <a:t> / 2</a:t>
-            </a:r>
+              <a:t> / </a:t>
+            </a:r>
+            <a:r>
+              <a:rPr lang="en-US" sz="1050" dirty="0" smtClean="0">
+                <a:latin typeface="Courier New"/>
+                <a:cs typeface="Courier New"/>
+              </a:rPr>
+              <a:t>3</a:t>
+            </a:r>
+            <a:endParaRPr lang="en-US" sz="1050" dirty="0" smtClean="0">
+              <a:latin typeface="Courier New"/>
+              <a:cs typeface="Courier New"/>
+            </a:endParaRPr>
           </a:p>
           <a:p>
             <a:pPr algn="ctr"/>

</xml_diff>